<commit_message>
[RG, MH] Add video to repo
</commit_message>
<xml_diff>
--- a/stuff/final_presentation/final_presentation_SW14_Free_36.pptx
+++ b/stuff/final_presentation/final_presentation_SW14_Free_36.pptx
@@ -4589,15 +4589,7 @@
                   <a:schemeClr val="tx1"/>
                 </a:solidFill>
               </a:rPr>
-              <a:t>Rene </a:t>
-            </a:r>
-            <a:r>
-              <a:rPr lang="de-AT" sz="2400" dirty="0" smtClean="0">
-                <a:solidFill>
-                  <a:schemeClr val="tx1"/>
-                </a:solidFill>
-              </a:rPr>
-              <a:t>Gau, Manuel Haid, Blaz Kolar</a:t>
+              <a:t>Rene Gau, Manuel Haid, Blaz Kolar</a:t>
             </a:r>
             <a:endParaRPr lang="de-AT" sz="2400" dirty="0">
               <a:solidFill>
@@ -4788,11 +4780,6 @@
               </a:rPr>
               <a:t>SW14_Free_36</a:t>
             </a:r>
-            <a:endParaRPr lang="de-AT" sz="2400" b="1" dirty="0">
-              <a:solidFill>
-                <a:schemeClr val="tx1"/>
-              </a:solidFill>
-            </a:endParaRPr>
           </a:p>
         </p:txBody>
       </p:sp>
@@ -4849,10 +4836,10 @@
           <a:lstStyle/>
           <a:p>
             <a:r>
-              <a:rPr lang="de-AT" sz="2400" dirty="0" smtClean="0">
+              <a:rPr lang="de-AT" sz="2400" smtClean="0">
                 <a:hlinkClick r:id="rId4"/>
               </a:rPr>
-              <a:t>http://www.gau.at/download/BeachvolleyAssist_video.avi</a:t>
+              <a:t>http://www.gau.at/download/BeachvolleyAssist-video.flv</a:t>
             </a:r>
             <a:endParaRPr lang="de-AT" dirty="0"/>
           </a:p>
@@ -5219,11 +5206,6 @@
               </a:rPr>
               <a:t>SW14_Free_36</a:t>
             </a:r>
-            <a:endParaRPr lang="de-AT" sz="2400" b="1" dirty="0">
-              <a:solidFill>
-                <a:schemeClr val="tx1"/>
-              </a:solidFill>
-            </a:endParaRPr>
           </a:p>
         </p:txBody>
       </p:sp>
@@ -5582,11 +5564,7 @@
             </a:r>
             <a:r>
               <a:rPr lang="de-AT" sz="2400" dirty="0" smtClean="0"/>
-              <a:t> </a:t>
-            </a:r>
-            <a:r>
-              <a:rPr lang="de-AT" sz="2400" dirty="0" smtClean="0"/>
-              <a:t>…</a:t>
+              <a:t> …</a:t>
             </a:r>
             <a:br>
               <a:rPr lang="de-AT" sz="2400" dirty="0" smtClean="0"/>
@@ -5790,11 +5768,6 @@
               </a:rPr>
               <a:t>SW14_Free_36</a:t>
             </a:r>
-            <a:endParaRPr lang="de-AT" sz="2400" b="1" dirty="0">
-              <a:solidFill>
-                <a:schemeClr val="tx1"/>
-              </a:solidFill>
-            </a:endParaRPr>
           </a:p>
         </p:txBody>
       </p:sp>
@@ -5975,11 +5948,6 @@
               </a:rPr>
               <a:t>SW14_Free_36</a:t>
             </a:r>
-            <a:endParaRPr lang="de-AT" sz="2400" b="1" dirty="0">
-              <a:solidFill>
-                <a:schemeClr val="tx1"/>
-              </a:solidFill>
-            </a:endParaRPr>
           </a:p>
         </p:txBody>
       </p:sp>
@@ -6037,11 +6005,6 @@
               </a:rPr>
               <a:t>?</a:t>
             </a:r>
-            <a:endParaRPr lang="de-AT" sz="6400" b="1" dirty="0">
-              <a:solidFill>
-                <a:srgbClr val="FF0000"/>
-              </a:solidFill>
-            </a:endParaRPr>
           </a:p>
         </p:txBody>
       </p:sp>

</xml_diff>